<commit_message>
Add more info to ppt
</commit_message>
<xml_diff>
--- a/Chess Snake Puzzles – 2022 IA Project.pptx
+++ b/Chess Snake Puzzles – 2022 IA Project.pptx
@@ -9,7 +9,8 @@
     <p:sldId id="257" r:id="rId3"/>
     <p:sldId id="258" r:id="rId4"/>
     <p:sldId id="259" r:id="rId5"/>
-    <p:sldId id="260" r:id="rId6"/>
+    <p:sldId id="261" r:id="rId6"/>
+    <p:sldId id="260" r:id="rId7"/>
   </p:sldIdLst>
   <p:sldSz cx="12192000" cy="6858000"/>
   <p:notesSz cx="6858000" cy="9144000"/>
@@ -116,6 +117,214 @@
 </p:presentation>
 </file>
 
+<file path=ppt/revisionInfo.xml><?xml version="1.0" encoding="utf-8"?>
+<p1510:revInfo xmlns:a="http://schemas.openxmlformats.org/drawingml/2006/main" xmlns:r="http://schemas.openxmlformats.org/officeDocument/2006/relationships" xmlns:p1510="http://schemas.microsoft.com/office/powerpoint/2015/10/main">
+  <p1510:revLst>
+    <p1510:client id="{C1F6FDB9-D3FC-4B78-9222-BDC7AD7E0D10}" v="299" dt="2022-04-03T22:23:16.173"/>
+  </p1510:revLst>
+</p1510:revInfo>
+</file>
+
+<file path=ppt/changesInfos/changesInfo1.xml><?xml version="1.0" encoding="utf-8"?>
+<pc:chgInfo xmlns:a="http://schemas.openxmlformats.org/drawingml/2006/main" xmlns:r="http://schemas.openxmlformats.org/officeDocument/2006/relationships" xmlns:ac="http://schemas.microsoft.com/office/drawing/2013/main/command" xmlns:pc="http://schemas.microsoft.com/office/powerpoint/2013/main/command">
+  <pc:docChgLst>
+    <pc:chgData name="Carlos Gomes" userId="befe0c0c48f41b83" providerId="LiveId" clId="{C1F6FDB9-D3FC-4B78-9222-BDC7AD7E0D10}"/>
+    <pc:docChg chg="undo redo custSel addSld modSld sldOrd">
+      <pc:chgData name="Carlos Gomes" userId="befe0c0c48f41b83" providerId="LiveId" clId="{C1F6FDB9-D3FC-4B78-9222-BDC7AD7E0D10}" dt="2022-04-03T22:34:10.935" v="3548" actId="20577"/>
+      <pc:docMkLst>
+        <pc:docMk/>
+      </pc:docMkLst>
+      <pc:sldChg chg="modSp mod">
+        <pc:chgData name="Carlos Gomes" userId="befe0c0c48f41b83" providerId="LiveId" clId="{C1F6FDB9-D3FC-4B78-9222-BDC7AD7E0D10}" dt="2022-04-03T22:34:10.935" v="3548" actId="20577"/>
+        <pc:sldMkLst>
+          <pc:docMk/>
+          <pc:sldMk cId="1231463357" sldId="256"/>
+        </pc:sldMkLst>
+        <pc:spChg chg="mod">
+          <ac:chgData name="Carlos Gomes" userId="befe0c0c48f41b83" providerId="LiveId" clId="{C1F6FDB9-D3FC-4B78-9222-BDC7AD7E0D10}" dt="2022-04-03T22:34:01.263" v="3534" actId="20577"/>
+          <ac:spMkLst>
+            <pc:docMk/>
+            <pc:sldMk cId="1231463357" sldId="256"/>
+            <ac:spMk id="2" creationId="{B9FDC1FF-3287-4630-8D77-E66685481EE7}"/>
+          </ac:spMkLst>
+        </pc:spChg>
+        <pc:spChg chg="mod">
+          <ac:chgData name="Carlos Gomes" userId="befe0c0c48f41b83" providerId="LiveId" clId="{C1F6FDB9-D3FC-4B78-9222-BDC7AD7E0D10}" dt="2022-04-03T22:34:10.935" v="3548" actId="20577"/>
+          <ac:spMkLst>
+            <pc:docMk/>
+            <pc:sldMk cId="1231463357" sldId="256"/>
+            <ac:spMk id="3" creationId="{FBB36667-5209-41C5-B231-1A1C67D43CB4}"/>
+          </ac:spMkLst>
+        </pc:spChg>
+      </pc:sldChg>
+      <pc:sldChg chg="modSp mod">
+        <pc:chgData name="Carlos Gomes" userId="befe0c0c48f41b83" providerId="LiveId" clId="{C1F6FDB9-D3FC-4B78-9222-BDC7AD7E0D10}" dt="2022-04-03T22:10:09.854" v="1141" actId="27636"/>
+        <pc:sldMkLst>
+          <pc:docMk/>
+          <pc:sldMk cId="1616608620" sldId="257"/>
+        </pc:sldMkLst>
+        <pc:spChg chg="mod">
+          <ac:chgData name="Carlos Gomes" userId="befe0c0c48f41b83" providerId="LiveId" clId="{C1F6FDB9-D3FC-4B78-9222-BDC7AD7E0D10}" dt="2022-04-03T22:10:09.854" v="1141" actId="27636"/>
+          <ac:spMkLst>
+            <pc:docMk/>
+            <pc:sldMk cId="1616608620" sldId="257"/>
+            <ac:spMk id="3" creationId="{300D1453-DC35-40B3-81DC-E9F3035DCC91}"/>
+          </ac:spMkLst>
+        </pc:spChg>
+      </pc:sldChg>
+      <pc:sldChg chg="addSp delSp modSp mod ord">
+        <pc:chgData name="Carlos Gomes" userId="befe0c0c48f41b83" providerId="LiveId" clId="{C1F6FDB9-D3FC-4B78-9222-BDC7AD7E0D10}" dt="2022-04-03T22:22:07.694" v="2732" actId="21"/>
+        <pc:sldMkLst>
+          <pc:docMk/>
+          <pc:sldMk cId="3204148524" sldId="258"/>
+        </pc:sldMkLst>
+        <pc:graphicFrameChg chg="add del mod">
+          <ac:chgData name="Carlos Gomes" userId="befe0c0c48f41b83" providerId="LiveId" clId="{C1F6FDB9-D3FC-4B78-9222-BDC7AD7E0D10}" dt="2022-04-03T22:20:06.200" v="2687" actId="478"/>
+          <ac:graphicFrameMkLst>
+            <pc:docMk/>
+            <pc:sldMk cId="3204148524" sldId="258"/>
+            <ac:graphicFrameMk id="4" creationId="{15FE3A57-5859-4DED-AC6D-4ABC0300A709}"/>
+          </ac:graphicFrameMkLst>
+        </pc:graphicFrameChg>
+        <pc:graphicFrameChg chg="add del mod">
+          <ac:chgData name="Carlos Gomes" userId="befe0c0c48f41b83" providerId="LiveId" clId="{C1F6FDB9-D3FC-4B78-9222-BDC7AD7E0D10}" dt="2022-04-03T22:22:07.694" v="2732" actId="21"/>
+          <ac:graphicFrameMkLst>
+            <pc:docMk/>
+            <pc:sldMk cId="3204148524" sldId="258"/>
+            <ac:graphicFrameMk id="5" creationId="{21D7BED5-4C06-4B67-AE57-B80BD5EB417A}"/>
+          </ac:graphicFrameMkLst>
+        </pc:graphicFrameChg>
+      </pc:sldChg>
+      <pc:sldChg chg="addSp delSp modSp mod">
+        <pc:chgData name="Carlos Gomes" userId="befe0c0c48f41b83" providerId="LiveId" clId="{C1F6FDB9-D3FC-4B78-9222-BDC7AD7E0D10}" dt="2022-04-03T22:26:51.256" v="3196" actId="20577"/>
+        <pc:sldMkLst>
+          <pc:docMk/>
+          <pc:sldMk cId="3251552042" sldId="259"/>
+        </pc:sldMkLst>
+        <pc:spChg chg="mod">
+          <ac:chgData name="Carlos Gomes" userId="befe0c0c48f41b83" providerId="LiveId" clId="{C1F6FDB9-D3FC-4B78-9222-BDC7AD7E0D10}" dt="2022-04-03T22:26:51.256" v="3196" actId="20577"/>
+          <ac:spMkLst>
+            <pc:docMk/>
+            <pc:sldMk cId="3251552042" sldId="259"/>
+            <ac:spMk id="3" creationId="{6EDDA152-6B00-4A16-8E42-4E16F0784E3C}"/>
+          </ac:spMkLst>
+        </pc:spChg>
+        <pc:spChg chg="add del">
+          <ac:chgData name="Carlos Gomes" userId="befe0c0c48f41b83" providerId="LiveId" clId="{C1F6FDB9-D3FC-4B78-9222-BDC7AD7E0D10}" dt="2022-04-03T21:47:10.040" v="494"/>
+          <ac:spMkLst>
+            <pc:docMk/>
+            <pc:sldMk cId="3251552042" sldId="259"/>
+            <ac:spMk id="4" creationId="{4E279C7A-7679-4AF3-830B-EFE48BB8D967}"/>
+          </ac:spMkLst>
+        </pc:spChg>
+        <pc:spChg chg="add del">
+          <ac:chgData name="Carlos Gomes" userId="befe0c0c48f41b83" providerId="LiveId" clId="{C1F6FDB9-D3FC-4B78-9222-BDC7AD7E0D10}" dt="2022-04-03T21:56:16.693" v="943" actId="22"/>
+          <ac:spMkLst>
+            <pc:docMk/>
+            <pc:sldMk cId="3251552042" sldId="259"/>
+            <ac:spMk id="7" creationId="{535BC4B4-9A16-4A6C-84DF-184FEFDC54AC}"/>
+          </ac:spMkLst>
+        </pc:spChg>
+        <pc:graphicFrameChg chg="add del mod modGraphic">
+          <ac:chgData name="Carlos Gomes" userId="befe0c0c48f41b83" providerId="LiveId" clId="{C1F6FDB9-D3FC-4B78-9222-BDC7AD7E0D10}" dt="2022-04-03T22:14:16.636" v="1897" actId="21"/>
+          <ac:graphicFrameMkLst>
+            <pc:docMk/>
+            <pc:sldMk cId="3251552042" sldId="259"/>
+            <ac:graphicFrameMk id="5" creationId="{1EB8202A-9BEF-41E5-9D28-8DFCB135B6DB}"/>
+          </ac:graphicFrameMkLst>
+        </pc:graphicFrameChg>
+        <pc:graphicFrameChg chg="add del mod modGraphic">
+          <ac:chgData name="Carlos Gomes" userId="befe0c0c48f41b83" providerId="LiveId" clId="{C1F6FDB9-D3FC-4B78-9222-BDC7AD7E0D10}" dt="2022-04-03T22:20:01.187" v="2686" actId="21"/>
+          <ac:graphicFrameMkLst>
+            <pc:docMk/>
+            <pc:sldMk cId="3251552042" sldId="259"/>
+            <ac:graphicFrameMk id="8" creationId="{8F319529-01CA-4C32-9474-3DD9769ECDD5}"/>
+          </ac:graphicFrameMkLst>
+        </pc:graphicFrameChg>
+        <pc:picChg chg="add del mod">
+          <ac:chgData name="Carlos Gomes" userId="befe0c0c48f41b83" providerId="LiveId" clId="{C1F6FDB9-D3FC-4B78-9222-BDC7AD7E0D10}" dt="2022-04-03T22:21:30.480" v="2725" actId="478"/>
+          <ac:picMkLst>
+            <pc:docMk/>
+            <pc:sldMk cId="3251552042" sldId="259"/>
+            <ac:picMk id="10" creationId="{07CB6FE5-4C69-4DFB-9E32-9DF3D2C06C1B}"/>
+          </ac:picMkLst>
+        </pc:picChg>
+      </pc:sldChg>
+      <pc:sldChg chg="modSp mod">
+        <pc:chgData name="Carlos Gomes" userId="befe0c0c48f41b83" providerId="LiveId" clId="{C1F6FDB9-D3FC-4B78-9222-BDC7AD7E0D10}" dt="2022-04-03T22:33:22.391" v="3529" actId="20577"/>
+        <pc:sldMkLst>
+          <pc:docMk/>
+          <pc:sldMk cId="3566798296" sldId="260"/>
+        </pc:sldMkLst>
+        <pc:spChg chg="mod">
+          <ac:chgData name="Carlos Gomes" userId="befe0c0c48f41b83" providerId="LiveId" clId="{C1F6FDB9-D3FC-4B78-9222-BDC7AD7E0D10}" dt="2022-04-03T22:33:22.391" v="3529" actId="20577"/>
+          <ac:spMkLst>
+            <pc:docMk/>
+            <pc:sldMk cId="3566798296" sldId="260"/>
+            <ac:spMk id="3" creationId="{0F091D75-4CD1-4815-A56A-5459ACC80F92}"/>
+          </ac:spMkLst>
+        </pc:spChg>
+      </pc:sldChg>
+      <pc:sldChg chg="addSp delSp modSp new mod">
+        <pc:chgData name="Carlos Gomes" userId="befe0c0c48f41b83" providerId="LiveId" clId="{C1F6FDB9-D3FC-4B78-9222-BDC7AD7E0D10}" dt="2022-04-03T22:23:37.387" v="2777" actId="1076"/>
+        <pc:sldMkLst>
+          <pc:docMk/>
+          <pc:sldMk cId="710399668" sldId="261"/>
+        </pc:sldMkLst>
+        <pc:spChg chg="mod">
+          <ac:chgData name="Carlos Gomes" userId="befe0c0c48f41b83" providerId="LiveId" clId="{C1F6FDB9-D3FC-4B78-9222-BDC7AD7E0D10}" dt="2022-04-03T22:23:37.387" v="2777" actId="1076"/>
+          <ac:spMkLst>
+            <pc:docMk/>
+            <pc:sldMk cId="710399668" sldId="261"/>
+            <ac:spMk id="2" creationId="{27EA0A15-A027-4F12-A914-BB6A52AC47A1}"/>
+          </ac:spMkLst>
+        </pc:spChg>
+        <pc:spChg chg="del">
+          <ac:chgData name="Carlos Gomes" userId="befe0c0c48f41b83" providerId="LiveId" clId="{C1F6FDB9-D3FC-4B78-9222-BDC7AD7E0D10}" dt="2022-04-03T22:22:11.383" v="2733" actId="478"/>
+          <ac:spMkLst>
+            <pc:docMk/>
+            <pc:sldMk cId="710399668" sldId="261"/>
+            <ac:spMk id="3" creationId="{AA2DF9EB-66C7-408B-BAF0-2E28C1A71B31}"/>
+          </ac:spMkLst>
+        </pc:spChg>
+        <pc:spChg chg="add del mod">
+          <ac:chgData name="Carlos Gomes" userId="befe0c0c48f41b83" providerId="LiveId" clId="{C1F6FDB9-D3FC-4B78-9222-BDC7AD7E0D10}" dt="2022-04-03T22:22:56.687" v="2755" actId="478"/>
+          <ac:spMkLst>
+            <pc:docMk/>
+            <pc:sldMk cId="710399668" sldId="261"/>
+            <ac:spMk id="5" creationId="{453EA7F5-C1AA-4B3A-B0DD-F6BC1AE0826A}"/>
+          </ac:spMkLst>
+        </pc:spChg>
+        <pc:spChg chg="add del mod">
+          <ac:chgData name="Carlos Gomes" userId="befe0c0c48f41b83" providerId="LiveId" clId="{C1F6FDB9-D3FC-4B78-9222-BDC7AD7E0D10}" dt="2022-04-03T22:23:10.839" v="2758" actId="478"/>
+          <ac:spMkLst>
+            <pc:docMk/>
+            <pc:sldMk cId="710399668" sldId="261"/>
+            <ac:spMk id="7" creationId="{5273FB21-2CD6-467F-8011-431EBC7575DA}"/>
+          </ac:spMkLst>
+        </pc:spChg>
+        <pc:spChg chg="add mod">
+          <ac:chgData name="Carlos Gomes" userId="befe0c0c48f41b83" providerId="LiveId" clId="{C1F6FDB9-D3FC-4B78-9222-BDC7AD7E0D10}" dt="2022-04-03T22:23:33.136" v="2776" actId="1076"/>
+          <ac:spMkLst>
+            <pc:docMk/>
+            <pc:sldMk cId="710399668" sldId="261"/>
+            <ac:spMk id="8" creationId="{96D95CC1-ECCC-45D2-987C-3AFB7CEA23D7}"/>
+          </ac:spMkLst>
+        </pc:spChg>
+        <pc:graphicFrameChg chg="add del mod modGraphic">
+          <ac:chgData name="Carlos Gomes" userId="befe0c0c48f41b83" providerId="LiveId" clId="{C1F6FDB9-D3FC-4B78-9222-BDC7AD7E0D10}" dt="2022-04-03T22:22:53.813" v="2754" actId="478"/>
+          <ac:graphicFrameMkLst>
+            <pc:docMk/>
+            <pc:sldMk cId="710399668" sldId="261"/>
+            <ac:graphicFrameMk id="4" creationId="{2A3F9839-4261-4ACA-B552-CBD09BE3B284}"/>
+          </ac:graphicFrameMkLst>
+        </pc:graphicFrameChg>
+      </pc:sldChg>
+    </pc:docChg>
+  </pc:docChgLst>
+</pc:chgInfo>
+</file>
+
 <file path=ppt/slideLayouts/slideLayout1.xml><?xml version="1.0" encoding="utf-8"?>
 <p:sldLayout xmlns:a="http://schemas.openxmlformats.org/drawingml/2006/main" xmlns:r="http://schemas.openxmlformats.org/officeDocument/2006/relationships" xmlns:p="http://schemas.openxmlformats.org/presentationml/2006/main" type="title" preserve="1">
   <p:cSld name="Title Slide">
@@ -263,7 +472,7 @@
           <a:p>
             <a:fld id="{76969C88-B244-455D-A017-012B25B1ACDD}" type="datetimeFigureOut">
               <a:rPr lang="en-US" smtClean="0"/>
-              <a:t>3/25/22</a:t>
+              <a:t>4/3/2022</a:t>
             </a:fld>
             <a:endParaRPr lang="en-US"/>
           </a:p>
@@ -317,7 +526,7 @@
           <a:p>
             <a:fld id="{07CE569E-9B7C-4CB9-AB80-C0841F922CFF}" type="slidenum">
               <a:rPr lang="en-US" smtClean="0"/>
-              <a:t>‹nº›</a:t>
+              <a:t>‹#›</a:t>
             </a:fld>
             <a:endParaRPr lang="en-US"/>
           </a:p>
@@ -461,7 +670,7 @@
           <a:p>
             <a:fld id="{76969C88-B244-455D-A017-012B25B1ACDD}" type="datetimeFigureOut">
               <a:rPr lang="en-US" smtClean="0"/>
-              <a:t>3/25/22</a:t>
+              <a:t>4/3/2022</a:t>
             </a:fld>
             <a:endParaRPr lang="en-US"/>
           </a:p>
@@ -515,7 +724,7 @@
           <a:p>
             <a:fld id="{07CE569E-9B7C-4CB9-AB80-C0841F922CFF}" type="slidenum">
               <a:rPr lang="en-US" smtClean="0"/>
-              <a:t>‹nº›</a:t>
+              <a:t>‹#›</a:t>
             </a:fld>
             <a:endParaRPr lang="en-US"/>
           </a:p>
@@ -669,7 +878,7 @@
           <a:p>
             <a:fld id="{76969C88-B244-455D-A017-012B25B1ACDD}" type="datetimeFigureOut">
               <a:rPr lang="en-US" smtClean="0"/>
-              <a:t>3/25/22</a:t>
+              <a:t>4/3/2022</a:t>
             </a:fld>
             <a:endParaRPr lang="en-US"/>
           </a:p>
@@ -723,7 +932,7 @@
           <a:p>
             <a:fld id="{07CE569E-9B7C-4CB9-AB80-C0841F922CFF}" type="slidenum">
               <a:rPr lang="en-US" smtClean="0"/>
-              <a:t>‹nº›</a:t>
+              <a:t>‹#›</a:t>
             </a:fld>
             <a:endParaRPr lang="en-US"/>
           </a:p>
@@ -868,7 +1077,7 @@
           <a:p>
             <a:fld id="{76969C88-B244-455D-A017-012B25B1ACDD}" type="datetimeFigureOut">
               <a:rPr lang="en-US" smtClean="0"/>
-              <a:t>3/25/22</a:t>
+              <a:t>4/3/2022</a:t>
             </a:fld>
             <a:endParaRPr lang="en-US"/>
           </a:p>
@@ -922,7 +1131,7 @@
           <a:p>
             <a:fld id="{07CE569E-9B7C-4CB9-AB80-C0841F922CFF}" type="slidenum">
               <a:rPr lang="en-US" smtClean="0"/>
-              <a:t>‹nº›</a:t>
+              <a:t>‹#›</a:t>
             </a:fld>
             <a:endParaRPr lang="en-US"/>
           </a:p>
@@ -1143,7 +1352,7 @@
           <a:p>
             <a:fld id="{76969C88-B244-455D-A017-012B25B1ACDD}" type="datetimeFigureOut">
               <a:rPr lang="en-US" smtClean="0"/>
-              <a:t>3/25/22</a:t>
+              <a:t>4/3/2022</a:t>
             </a:fld>
             <a:endParaRPr lang="en-US"/>
           </a:p>
@@ -1197,7 +1406,7 @@
           <a:p>
             <a:fld id="{07CE569E-9B7C-4CB9-AB80-C0841F922CFF}" type="slidenum">
               <a:rPr lang="en-US" smtClean="0"/>
-              <a:t>‹nº›</a:t>
+              <a:t>‹#›</a:t>
             </a:fld>
             <a:endParaRPr lang="en-US"/>
           </a:p>
@@ -1408,7 +1617,7 @@
           <a:p>
             <a:fld id="{76969C88-B244-455D-A017-012B25B1ACDD}" type="datetimeFigureOut">
               <a:rPr lang="en-US" smtClean="0"/>
-              <a:t>3/25/22</a:t>
+              <a:t>4/3/2022</a:t>
             </a:fld>
             <a:endParaRPr lang="en-US"/>
           </a:p>
@@ -1462,7 +1671,7 @@
           <a:p>
             <a:fld id="{07CE569E-9B7C-4CB9-AB80-C0841F922CFF}" type="slidenum">
               <a:rPr lang="en-US" smtClean="0"/>
-              <a:t>‹nº›</a:t>
+              <a:t>‹#›</a:t>
             </a:fld>
             <a:endParaRPr lang="en-US"/>
           </a:p>
@@ -1820,7 +2029,7 @@
           <a:p>
             <a:fld id="{76969C88-B244-455D-A017-012B25B1ACDD}" type="datetimeFigureOut">
               <a:rPr lang="en-US" smtClean="0"/>
-              <a:t>3/25/22</a:t>
+              <a:t>4/3/2022</a:t>
             </a:fld>
             <a:endParaRPr lang="en-US"/>
           </a:p>
@@ -1874,7 +2083,7 @@
           <a:p>
             <a:fld id="{07CE569E-9B7C-4CB9-AB80-C0841F922CFF}" type="slidenum">
               <a:rPr lang="en-US" smtClean="0"/>
-              <a:t>‹nº›</a:t>
+              <a:t>‹#›</a:t>
             </a:fld>
             <a:endParaRPr lang="en-US"/>
           </a:p>
@@ -1961,7 +2170,7 @@
           <a:p>
             <a:fld id="{76969C88-B244-455D-A017-012B25B1ACDD}" type="datetimeFigureOut">
               <a:rPr lang="en-US" smtClean="0"/>
-              <a:t>3/25/22</a:t>
+              <a:t>4/3/2022</a:t>
             </a:fld>
             <a:endParaRPr lang="en-US"/>
           </a:p>
@@ -2015,7 +2224,7 @@
           <a:p>
             <a:fld id="{07CE569E-9B7C-4CB9-AB80-C0841F922CFF}" type="slidenum">
               <a:rPr lang="en-US" smtClean="0"/>
-              <a:t>‹nº›</a:t>
+              <a:t>‹#›</a:t>
             </a:fld>
             <a:endParaRPr lang="en-US"/>
           </a:p>
@@ -2074,7 +2283,7 @@
           <a:p>
             <a:fld id="{76969C88-B244-455D-A017-012B25B1ACDD}" type="datetimeFigureOut">
               <a:rPr lang="en-US" smtClean="0"/>
-              <a:t>3/25/22</a:t>
+              <a:t>4/3/2022</a:t>
             </a:fld>
             <a:endParaRPr lang="en-US"/>
           </a:p>
@@ -2128,7 +2337,7 @@
           <a:p>
             <a:fld id="{07CE569E-9B7C-4CB9-AB80-C0841F922CFF}" type="slidenum">
               <a:rPr lang="en-US" smtClean="0"/>
-              <a:t>‹nº›</a:t>
+              <a:t>‹#›</a:t>
             </a:fld>
             <a:endParaRPr lang="en-US"/>
           </a:p>
@@ -2386,7 +2595,7 @@
           <a:p>
             <a:fld id="{76969C88-B244-455D-A017-012B25B1ACDD}" type="datetimeFigureOut">
               <a:rPr lang="en-US" smtClean="0"/>
-              <a:t>3/25/22</a:t>
+              <a:t>4/3/2022</a:t>
             </a:fld>
             <a:endParaRPr lang="en-US"/>
           </a:p>
@@ -2440,7 +2649,7 @@
           <a:p>
             <a:fld id="{07CE569E-9B7C-4CB9-AB80-C0841F922CFF}" type="slidenum">
               <a:rPr lang="en-US" smtClean="0"/>
-              <a:t>‹nº›</a:t>
+              <a:t>‹#›</a:t>
             </a:fld>
             <a:endParaRPr lang="en-US"/>
           </a:p>
@@ -2677,7 +2886,7 @@
           <a:p>
             <a:fld id="{76969C88-B244-455D-A017-012B25B1ACDD}" type="datetimeFigureOut">
               <a:rPr lang="en-US" smtClean="0"/>
-              <a:t>3/25/22</a:t>
+              <a:t>4/3/2022</a:t>
             </a:fld>
             <a:endParaRPr lang="en-US"/>
           </a:p>
@@ -2731,7 +2940,7 @@
           <a:p>
             <a:fld id="{07CE569E-9B7C-4CB9-AB80-C0841F922CFF}" type="slidenum">
               <a:rPr lang="en-US" smtClean="0"/>
-              <a:t>‹nº›</a:t>
+              <a:t>‹#›</a:t>
             </a:fld>
             <a:endParaRPr lang="en-US"/>
           </a:p>
@@ -3433,7 +3642,7 @@
             <a:fld id="{76969C88-B244-455D-A017-012B25B1ACDD}" type="datetimeFigureOut">
               <a:rPr lang="en-US" smtClean="0"/>
               <a:pPr/>
-              <a:t>3/25/22</a:t>
+              <a:t>4/3/2022</a:t>
             </a:fld>
             <a:endParaRPr lang="en-US"/>
           </a:p>
@@ -3526,7 +3735,7 @@
             <a:fld id="{07CE569E-9B7C-4CB9-AB80-C0841F922CFF}" type="slidenum">
               <a:rPr lang="en-US" smtClean="0"/>
               <a:pPr/>
-              <a:t>‹nº›</a:t>
+              <a:t>‹#›</a:t>
             </a:fld>
             <a:endParaRPr lang="en-US"/>
           </a:p>
@@ -3974,22 +4183,16 @@
           </a:bodyPr>
           <a:lstStyle/>
           <a:p>
-            <a:pPr algn="l"/>
-            <a:r>
-              <a:rPr lang="pt-PT" sz="4400" u="sng" dirty="0" err="1"/>
-              <a:t>Chess</a:t>
-            </a:r>
             <a:r>
               <a:rPr lang="pt-PT" sz="4400" u="sng" dirty="0"/>
-              <a:t> </a:t>
-            </a:r>
-            <a:r>
-              <a:rPr lang="pt-PT" sz="4400" u="sng" dirty="0" err="1"/>
-              <a:t>Snake</a:t>
-            </a:r>
-            <a:r>
+              <a:t>Chess Snake </a:t>
+            </a:r>
+            <a:br>
               <a:rPr lang="pt-PT" sz="4400" u="sng" dirty="0"/>
-              <a:t> Puzzles – 2022 IA Project</a:t>
+            </a:br>
+            <a:r>
+              <a:rPr lang="pt-PT" sz="4400" u="sng" dirty="0"/>
+              <a:t>IART Project</a:t>
             </a:r>
           </a:p>
         </p:txBody>
@@ -4025,21 +4228,21 @@
             <a:pPr algn="l"/>
             <a:r>
               <a:rPr lang="pt-PT" dirty="0"/>
-              <a:t>Carlos Gomes – UP201906622</a:t>
+              <a:t>Carlos Gomes – up201906622</a:t>
             </a:r>
           </a:p>
           <a:p>
             <a:pPr algn="l"/>
             <a:r>
               <a:rPr lang="pt-PT" dirty="0"/>
-              <a:t>Domingos Santos – UP201906680</a:t>
+              <a:t>Domingos Santos – up201906680</a:t>
             </a:r>
           </a:p>
           <a:p>
             <a:pPr algn="l"/>
             <a:r>
               <a:rPr lang="pt-PT" dirty="0"/>
-              <a:t>Filipe Pinto – UP201907747</a:t>
+              <a:t>Filipe Pinto – up201907747</a:t>
             </a:r>
           </a:p>
         </p:txBody>
@@ -4567,397 +4770,61 @@
         <p:spPr/>
         <p:txBody>
           <a:bodyPr>
-            <a:normAutofit lnSpcReduction="10000"/>
+            <a:normAutofit fontScale="70000" lnSpcReduction="20000"/>
           </a:bodyPr>
           <a:lstStyle/>
           <a:p>
             <a:r>
-              <a:rPr lang="pt-PT" dirty="0" err="1"/>
-              <a:t>The</a:t>
-            </a:r>
-            <a:r>
               <a:rPr lang="pt-PT" dirty="0"/>
-              <a:t> </a:t>
-            </a:r>
-            <a:r>
-              <a:rPr lang="pt-PT" dirty="0" err="1"/>
-              <a:t>main</a:t>
-            </a:r>
+              <a:t>The main goal for this project is to, based on Artificial Inteligence skills and search algorithms, implement a version of the puzzle “Chess Snake”;</a:t>
+            </a:r>
+          </a:p>
+          <a:p>
             <a:r>
               <a:rPr lang="pt-PT" dirty="0"/>
-              <a:t> </a:t>
-            </a:r>
-            <a:r>
-              <a:rPr lang="pt-PT" dirty="0" err="1"/>
-              <a:t>goal</a:t>
-            </a:r>
+              <a:t>The main goal of the puzzle is to connect the bottom left tile of the board with the top right tile, by creating a path according to some rules;</a:t>
+            </a:r>
+          </a:p>
+          <a:p>
             <a:r>
               <a:rPr lang="pt-PT" dirty="0"/>
-              <a:t> for </a:t>
-            </a:r>
-            <a:r>
-              <a:rPr lang="pt-PT" dirty="0" err="1"/>
-              <a:t>this</a:t>
-            </a:r>
+              <a:t>The rules are: </a:t>
+            </a:r>
+          </a:p>
+          <a:p>
+            <a:pPr marL="0" indent="0">
+              <a:buNone/>
+            </a:pPr>
             <a:r>
               <a:rPr lang="pt-PT" dirty="0"/>
-              <a:t> </a:t>
-            </a:r>
-            <a:r>
-              <a:rPr lang="pt-PT" dirty="0" err="1"/>
-              <a:t>project</a:t>
-            </a:r>
+              <a:t>    - No loops are allowed;</a:t>
+            </a:r>
+          </a:p>
+          <a:p>
+            <a:pPr marL="0" indent="0">
+              <a:buNone/>
+            </a:pPr>
             <a:r>
               <a:rPr lang="pt-PT" dirty="0"/>
-              <a:t> </a:t>
-            </a:r>
-            <a:r>
-              <a:rPr lang="pt-PT" dirty="0" err="1"/>
-              <a:t>is</a:t>
-            </a:r>
+              <a:t>    - Each chess piece attacks and equal number of squares of the choose path;</a:t>
+            </a:r>
+          </a:p>
+          <a:p>
+            <a:pPr marL="0" indent="0">
+              <a:buNone/>
+            </a:pPr>
             <a:r>
               <a:rPr lang="pt-PT" dirty="0"/>
-              <a:t> to, </a:t>
-            </a:r>
-            <a:r>
-              <a:rPr lang="pt-PT" dirty="0" err="1"/>
-              <a:t>based</a:t>
-            </a:r>
+              <a:t>    - Pieces may not be crossed by the path</a:t>
+            </a:r>
+          </a:p>
+          <a:p>
+            <a:pPr marL="0" indent="0">
+              <a:buNone/>
+            </a:pPr>
             <a:r>
               <a:rPr lang="pt-PT" dirty="0"/>
-              <a:t> </a:t>
-            </a:r>
-            <a:r>
-              <a:rPr lang="pt-PT" dirty="0" err="1"/>
-              <a:t>on</a:t>
-            </a:r>
-            <a:r>
-              <a:rPr lang="pt-PT" dirty="0"/>
-              <a:t> Artificial </a:t>
-            </a:r>
-            <a:r>
-              <a:rPr lang="pt-PT" dirty="0" err="1"/>
-              <a:t>Inteligence</a:t>
-            </a:r>
-            <a:r>
-              <a:rPr lang="pt-PT" dirty="0"/>
-              <a:t> </a:t>
-            </a:r>
-            <a:r>
-              <a:rPr lang="pt-PT" dirty="0" err="1"/>
-              <a:t>skills</a:t>
-            </a:r>
-            <a:r>
-              <a:rPr lang="pt-PT" dirty="0"/>
-              <a:t>, </a:t>
-            </a:r>
-            <a:r>
-              <a:rPr lang="pt-PT" dirty="0" err="1"/>
-              <a:t>and</a:t>
-            </a:r>
-            <a:r>
-              <a:rPr lang="pt-PT" dirty="0"/>
-              <a:t> </a:t>
-            </a:r>
-            <a:r>
-              <a:rPr lang="pt-PT" dirty="0" err="1"/>
-              <a:t>search</a:t>
-            </a:r>
-            <a:r>
-              <a:rPr lang="pt-PT" dirty="0"/>
-              <a:t> </a:t>
-            </a:r>
-            <a:r>
-              <a:rPr lang="pt-PT" dirty="0" err="1"/>
-              <a:t>algorithms</a:t>
-            </a:r>
-            <a:r>
-              <a:rPr lang="pt-PT" dirty="0"/>
-              <a:t>, </a:t>
-            </a:r>
-            <a:r>
-              <a:rPr lang="pt-PT" dirty="0" err="1"/>
-              <a:t>draw</a:t>
-            </a:r>
-            <a:r>
-              <a:rPr lang="pt-PT" dirty="0"/>
-              <a:t> a </a:t>
-            </a:r>
-            <a:r>
-              <a:rPr lang="pt-PT" dirty="0" err="1"/>
-              <a:t>snake</a:t>
-            </a:r>
-            <a:r>
-              <a:rPr lang="pt-PT" dirty="0"/>
-              <a:t> </a:t>
-            </a:r>
-            <a:r>
-              <a:rPr lang="pt-PT" dirty="0" err="1"/>
-              <a:t>that</a:t>
-            </a:r>
-            <a:r>
-              <a:rPr lang="pt-PT" dirty="0"/>
-              <a:t> </a:t>
-            </a:r>
-            <a:r>
-              <a:rPr lang="pt-PT" dirty="0" err="1"/>
-              <a:t>goes</a:t>
-            </a:r>
-            <a:r>
-              <a:rPr lang="pt-PT" dirty="0"/>
-              <a:t> </a:t>
-            </a:r>
-            <a:r>
-              <a:rPr lang="pt-PT" dirty="0" err="1"/>
-              <a:t>from</a:t>
-            </a:r>
-            <a:r>
-              <a:rPr lang="pt-PT" dirty="0"/>
-              <a:t> </a:t>
-            </a:r>
-            <a:r>
-              <a:rPr lang="pt-PT" dirty="0" err="1"/>
-              <a:t>the</a:t>
-            </a:r>
-            <a:r>
-              <a:rPr lang="pt-PT" dirty="0"/>
-              <a:t> </a:t>
-            </a:r>
-            <a:r>
-              <a:rPr lang="pt-PT" dirty="0" err="1"/>
-              <a:t>lower</a:t>
-            </a:r>
-            <a:r>
-              <a:rPr lang="pt-PT" dirty="0"/>
-              <a:t> </a:t>
-            </a:r>
-            <a:r>
-              <a:rPr lang="pt-PT" dirty="0" err="1"/>
-              <a:t>left</a:t>
-            </a:r>
-            <a:r>
-              <a:rPr lang="pt-PT" dirty="0"/>
-              <a:t> </a:t>
-            </a:r>
-            <a:r>
-              <a:rPr lang="pt-PT" dirty="0" err="1"/>
-              <a:t>square</a:t>
-            </a:r>
-            <a:r>
-              <a:rPr lang="pt-PT" dirty="0"/>
-              <a:t> to </a:t>
-            </a:r>
-            <a:r>
-              <a:rPr lang="pt-PT" dirty="0" err="1"/>
-              <a:t>the</a:t>
-            </a:r>
-            <a:r>
-              <a:rPr lang="pt-PT" dirty="0"/>
-              <a:t> </a:t>
-            </a:r>
-            <a:r>
-              <a:rPr lang="pt-PT" dirty="0" err="1"/>
-              <a:t>upper</a:t>
-            </a:r>
-            <a:r>
-              <a:rPr lang="pt-PT" dirty="0"/>
-              <a:t> </a:t>
-            </a:r>
-            <a:r>
-              <a:rPr lang="pt-PT" dirty="0" err="1"/>
-              <a:t>right</a:t>
-            </a:r>
-            <a:r>
-              <a:rPr lang="pt-PT" dirty="0"/>
-              <a:t> </a:t>
-            </a:r>
-            <a:r>
-              <a:rPr lang="pt-PT" dirty="0" err="1"/>
-              <a:t>square</a:t>
-            </a:r>
-            <a:r>
-              <a:rPr lang="pt-PT" dirty="0"/>
-              <a:t>;</a:t>
-            </a:r>
-          </a:p>
-          <a:p>
-            <a:r>
-              <a:rPr lang="pt-PT" dirty="0" err="1"/>
-              <a:t>Each</a:t>
-            </a:r>
-            <a:r>
-              <a:rPr lang="pt-PT" dirty="0"/>
-              <a:t> </a:t>
-            </a:r>
-            <a:r>
-              <a:rPr lang="pt-PT" dirty="0" err="1"/>
-              <a:t>chess</a:t>
-            </a:r>
-            <a:r>
-              <a:rPr lang="pt-PT" dirty="0"/>
-              <a:t> </a:t>
-            </a:r>
-            <a:r>
-              <a:rPr lang="pt-PT" dirty="0" err="1"/>
-              <a:t>piece</a:t>
-            </a:r>
-            <a:r>
-              <a:rPr lang="pt-PT" dirty="0"/>
-              <a:t> </a:t>
-            </a:r>
-            <a:r>
-              <a:rPr lang="pt-PT" dirty="0" err="1"/>
-              <a:t>should</a:t>
-            </a:r>
-            <a:r>
-              <a:rPr lang="pt-PT" dirty="0"/>
-              <a:t> </a:t>
-            </a:r>
-            <a:r>
-              <a:rPr lang="pt-PT" dirty="0" err="1"/>
-              <a:t>attack</a:t>
-            </a:r>
-            <a:r>
-              <a:rPr lang="pt-PT" dirty="0"/>
-              <a:t> </a:t>
-            </a:r>
-            <a:r>
-              <a:rPr lang="pt-PT" dirty="0" err="1"/>
-              <a:t>the</a:t>
-            </a:r>
-            <a:r>
-              <a:rPr lang="pt-PT" dirty="0"/>
-              <a:t> </a:t>
-            </a:r>
-            <a:r>
-              <a:rPr lang="pt-PT" dirty="0" err="1"/>
-              <a:t>same</a:t>
-            </a:r>
-            <a:r>
-              <a:rPr lang="pt-PT" dirty="0"/>
-              <a:t> </a:t>
-            </a:r>
-            <a:r>
-              <a:rPr lang="pt-PT" dirty="0" err="1"/>
-              <a:t>number</a:t>
-            </a:r>
-            <a:r>
-              <a:rPr lang="pt-PT" dirty="0"/>
-              <a:t> </a:t>
-            </a:r>
-            <a:r>
-              <a:rPr lang="pt-PT" dirty="0" err="1"/>
-              <a:t>of</a:t>
-            </a:r>
-            <a:r>
-              <a:rPr lang="pt-PT" dirty="0"/>
-              <a:t> </a:t>
-            </a:r>
-            <a:r>
-              <a:rPr lang="pt-PT" dirty="0" err="1"/>
-              <a:t>segments</a:t>
-            </a:r>
-            <a:r>
-              <a:rPr lang="pt-PT" dirty="0"/>
-              <a:t> </a:t>
-            </a:r>
-            <a:r>
-              <a:rPr lang="pt-PT" dirty="0" err="1"/>
-              <a:t>of</a:t>
-            </a:r>
-            <a:r>
-              <a:rPr lang="pt-PT" dirty="0"/>
-              <a:t> </a:t>
-            </a:r>
-            <a:r>
-              <a:rPr lang="pt-PT" dirty="0" err="1"/>
-              <a:t>the</a:t>
-            </a:r>
-            <a:r>
-              <a:rPr lang="pt-PT" dirty="0"/>
-              <a:t> </a:t>
-            </a:r>
-            <a:r>
-              <a:rPr lang="pt-PT" dirty="0" err="1"/>
-              <a:t>snake</a:t>
-            </a:r>
-            <a:r>
-              <a:rPr lang="pt-PT" dirty="0"/>
-              <a:t>;</a:t>
-            </a:r>
-          </a:p>
-          <a:p>
-            <a:r>
-              <a:rPr lang="pt-PT" dirty="0" err="1"/>
-              <a:t>This</a:t>
-            </a:r>
-            <a:r>
-              <a:rPr lang="pt-PT" dirty="0"/>
-              <a:t> </a:t>
-            </a:r>
-            <a:r>
-              <a:rPr lang="pt-PT" dirty="0" err="1"/>
-              <a:t>project</a:t>
-            </a:r>
-            <a:r>
-              <a:rPr lang="pt-PT" dirty="0"/>
-              <a:t> </a:t>
-            </a:r>
-            <a:r>
-              <a:rPr lang="pt-PT" dirty="0" err="1"/>
-              <a:t>should</a:t>
-            </a:r>
-            <a:r>
-              <a:rPr lang="pt-PT" dirty="0"/>
-              <a:t> </a:t>
-            </a:r>
-            <a:r>
-              <a:rPr lang="pt-PT" dirty="0" err="1"/>
-              <a:t>allow</a:t>
-            </a:r>
-            <a:r>
-              <a:rPr lang="pt-PT" dirty="0"/>
-              <a:t> </a:t>
-            </a:r>
-            <a:r>
-              <a:rPr lang="pt-PT" dirty="0" err="1"/>
-              <a:t>different</a:t>
-            </a:r>
-            <a:r>
-              <a:rPr lang="pt-PT" dirty="0"/>
-              <a:t> </a:t>
-            </a:r>
-            <a:r>
-              <a:rPr lang="pt-PT" dirty="0" err="1"/>
-              <a:t>level</a:t>
-            </a:r>
-            <a:r>
-              <a:rPr lang="pt-PT" dirty="0"/>
-              <a:t> games </a:t>
-            </a:r>
-            <a:r>
-              <a:rPr lang="pt-PT" dirty="0" err="1"/>
-              <a:t>and</a:t>
-            </a:r>
-            <a:r>
-              <a:rPr lang="pt-PT" dirty="0"/>
-              <a:t> </a:t>
-            </a:r>
-            <a:r>
-              <a:rPr lang="pt-PT" dirty="0" err="1"/>
-              <a:t>multiplayer</a:t>
-            </a:r>
-            <a:r>
-              <a:rPr lang="pt-PT" dirty="0"/>
-              <a:t> </a:t>
-            </a:r>
-            <a:r>
-              <a:rPr lang="pt-PT" dirty="0" err="1"/>
-              <a:t>options</a:t>
-            </a:r>
-            <a:r>
-              <a:rPr lang="pt-PT" dirty="0"/>
-              <a:t>;</a:t>
+              <a:t>    - The snake cannot touch itself.</a:t>
             </a:r>
           </a:p>
         </p:txBody>
@@ -5189,308 +5056,26 @@
         <p:spPr/>
         <p:txBody>
           <a:bodyPr>
-            <a:normAutofit lnSpcReduction="10000"/>
+            <a:normAutofit fontScale="77500" lnSpcReduction="20000"/>
           </a:bodyPr>
           <a:lstStyle/>
           <a:p>
             <a:r>
-              <a:rPr lang="pt-PT" dirty="0" err="1"/>
-              <a:t>Multiple</a:t>
-            </a:r>
-            <a:r>
               <a:rPr lang="pt-PT" dirty="0"/>
-              <a:t> </a:t>
-            </a:r>
-            <a:r>
-              <a:rPr lang="pt-PT" dirty="0" err="1"/>
-              <a:t>State</a:t>
-            </a:r>
+              <a:t>State Representation: The board is represented by a matrix (list of lists) start and end tile are represented by the char ‘s’ and ‘f’, respectively, each chess piece is also represented by a char (king – k, queen – q, bishop – b, knigth – n, rook –r and pawn - p) the path tiles are represented with a 1 and the empty tiles with a 0.</a:t>
+            </a:r>
+          </a:p>
+          <a:p>
             <a:r>
               <a:rPr lang="pt-PT" dirty="0"/>
-              <a:t> </a:t>
-            </a:r>
-            <a:r>
-              <a:rPr lang="pt-PT" dirty="0" err="1"/>
-              <a:t>Problem</a:t>
-            </a:r>
+              <a:t>Initial state: The initial state is represented with the given chess tiles defined in the board and the start and finish tiles well-marked as well.</a:t>
+            </a:r>
+          </a:p>
+          <a:p>
             <a:r>
               <a:rPr lang="pt-PT" dirty="0"/>
-              <a:t>;</a:t>
-            </a:r>
-          </a:p>
-          <a:p>
-            <a:r>
-              <a:rPr lang="pt-PT" dirty="0" err="1"/>
-              <a:t>State</a:t>
-            </a:r>
-            <a:r>
-              <a:rPr lang="pt-PT" dirty="0"/>
-              <a:t> </a:t>
-            </a:r>
-            <a:r>
-              <a:rPr lang="pt-PT" dirty="0" err="1"/>
-              <a:t>Space</a:t>
-            </a:r>
-            <a:r>
-              <a:rPr lang="pt-PT" dirty="0"/>
-              <a:t>:</a:t>
-            </a:r>
-          </a:p>
-          <a:p>
-            <a:pPr lvl="1"/>
-            <a:r>
-              <a:rPr lang="pt-PT" dirty="0" err="1"/>
-              <a:t>Initial</a:t>
-            </a:r>
-            <a:r>
-              <a:rPr lang="pt-PT" dirty="0"/>
-              <a:t> </a:t>
-            </a:r>
-            <a:r>
-              <a:rPr lang="pt-PT" dirty="0" err="1"/>
-              <a:t>State</a:t>
-            </a:r>
-            <a:r>
-              <a:rPr lang="pt-PT" dirty="0"/>
-              <a:t>: Puzzle </a:t>
-            </a:r>
-            <a:r>
-              <a:rPr lang="pt-PT" dirty="0" err="1"/>
-              <a:t>with</a:t>
-            </a:r>
-            <a:r>
-              <a:rPr lang="pt-PT" dirty="0"/>
-              <a:t> 2 </a:t>
-            </a:r>
-            <a:r>
-              <a:rPr lang="pt-PT" dirty="0" err="1"/>
-              <a:t>pieces</a:t>
-            </a:r>
-            <a:r>
-              <a:rPr lang="pt-PT" dirty="0"/>
-              <a:t>;</a:t>
-            </a:r>
-          </a:p>
-          <a:p>
-            <a:pPr lvl="1"/>
-            <a:r>
-              <a:rPr lang="pt-PT" dirty="0" err="1"/>
-              <a:t>Possible</a:t>
-            </a:r>
-            <a:r>
-              <a:rPr lang="pt-PT" dirty="0"/>
-              <a:t> </a:t>
-            </a:r>
-            <a:r>
-              <a:rPr lang="pt-PT" dirty="0" err="1"/>
-              <a:t>operations</a:t>
-            </a:r>
-            <a:r>
-              <a:rPr lang="pt-PT" dirty="0"/>
-              <a:t>: LEFT, RIGHT, UP, DOWN;</a:t>
-            </a:r>
-          </a:p>
-          <a:p>
-            <a:pPr lvl="1"/>
-            <a:r>
-              <a:rPr lang="pt-PT" dirty="0" err="1"/>
-              <a:t>Objective</a:t>
-            </a:r>
-            <a:r>
-              <a:rPr lang="pt-PT" dirty="0"/>
-              <a:t> </a:t>
-            </a:r>
-            <a:r>
-              <a:rPr lang="pt-PT" dirty="0" err="1"/>
-              <a:t>state</a:t>
-            </a:r>
-            <a:r>
-              <a:rPr lang="pt-PT" dirty="0"/>
-              <a:t>: “</a:t>
-            </a:r>
-            <a:r>
-              <a:rPr lang="pt-PT" dirty="0" err="1"/>
-              <a:t>each</a:t>
-            </a:r>
-            <a:r>
-              <a:rPr lang="pt-PT" dirty="0"/>
-              <a:t> </a:t>
-            </a:r>
-            <a:r>
-              <a:rPr lang="pt-PT" dirty="0" err="1"/>
-              <a:t>chess</a:t>
-            </a:r>
-            <a:r>
-              <a:rPr lang="pt-PT" dirty="0"/>
-              <a:t> </a:t>
-            </a:r>
-            <a:r>
-              <a:rPr lang="pt-PT" dirty="0" err="1"/>
-              <a:t>piece</a:t>
-            </a:r>
-            <a:r>
-              <a:rPr lang="pt-PT" dirty="0"/>
-              <a:t> </a:t>
-            </a:r>
-            <a:r>
-              <a:rPr lang="pt-PT" dirty="0" err="1"/>
-              <a:t>should</a:t>
-            </a:r>
-            <a:r>
-              <a:rPr lang="pt-PT" dirty="0"/>
-              <a:t> </a:t>
-            </a:r>
-            <a:r>
-              <a:rPr lang="pt-PT" dirty="0" err="1"/>
-              <a:t>attack</a:t>
-            </a:r>
-            <a:r>
-              <a:rPr lang="pt-PT" dirty="0"/>
-              <a:t> </a:t>
-            </a:r>
-            <a:r>
-              <a:rPr lang="pt-PT" dirty="0" err="1"/>
-              <a:t>the</a:t>
-            </a:r>
-            <a:r>
-              <a:rPr lang="pt-PT" dirty="0"/>
-              <a:t> </a:t>
-            </a:r>
-            <a:r>
-              <a:rPr lang="pt-PT" dirty="0" err="1"/>
-              <a:t>same</a:t>
-            </a:r>
-            <a:r>
-              <a:rPr lang="pt-PT" dirty="0"/>
-              <a:t> </a:t>
-            </a:r>
-            <a:r>
-              <a:rPr lang="pt-PT" dirty="0" err="1"/>
-              <a:t>number</a:t>
-            </a:r>
-            <a:r>
-              <a:rPr lang="pt-PT" dirty="0"/>
-              <a:t> </a:t>
-            </a:r>
-            <a:r>
-              <a:rPr lang="pt-PT" dirty="0" err="1"/>
-              <a:t>of</a:t>
-            </a:r>
-            <a:r>
-              <a:rPr lang="pt-PT" dirty="0"/>
-              <a:t> </a:t>
-            </a:r>
-            <a:r>
-              <a:rPr lang="pt-PT" dirty="0" err="1"/>
-              <a:t>segments</a:t>
-            </a:r>
-            <a:r>
-              <a:rPr lang="pt-PT" dirty="0"/>
-              <a:t> </a:t>
-            </a:r>
-            <a:r>
-              <a:rPr lang="pt-PT" dirty="0" err="1"/>
-              <a:t>of</a:t>
-            </a:r>
-            <a:r>
-              <a:rPr lang="pt-PT" dirty="0"/>
-              <a:t> </a:t>
-            </a:r>
-            <a:r>
-              <a:rPr lang="pt-PT" dirty="0" err="1"/>
-              <a:t>the</a:t>
-            </a:r>
-            <a:r>
-              <a:rPr lang="pt-PT" dirty="0"/>
-              <a:t> </a:t>
-            </a:r>
-            <a:r>
-              <a:rPr lang="pt-PT" dirty="0" err="1"/>
-              <a:t>snake</a:t>
-            </a:r>
-            <a:r>
-              <a:rPr lang="pt-PT" dirty="0"/>
-              <a:t>” (Não sei descrever o </a:t>
-            </a:r>
-            <a:r>
-              <a:rPr lang="pt-PT" dirty="0" err="1"/>
-              <a:t>state</a:t>
-            </a:r>
-            <a:r>
-              <a:rPr lang="pt-PT" dirty="0"/>
-              <a:t> aqui);</a:t>
-            </a:r>
-          </a:p>
-          <a:p>
-            <a:pPr lvl="1"/>
-            <a:r>
-              <a:rPr lang="pt-PT" dirty="0" err="1"/>
-              <a:t>Solution</a:t>
-            </a:r>
-            <a:r>
-              <a:rPr lang="pt-PT" dirty="0"/>
-              <a:t> </a:t>
-            </a:r>
-            <a:r>
-              <a:rPr lang="pt-PT" dirty="0" err="1"/>
-              <a:t>costs</a:t>
-            </a:r>
-            <a:r>
-              <a:rPr lang="pt-PT" dirty="0"/>
-              <a:t>: </a:t>
-            </a:r>
-            <a:r>
-              <a:rPr lang="pt-PT" dirty="0" err="1"/>
-              <a:t>each</a:t>
-            </a:r>
-            <a:r>
-              <a:rPr lang="pt-PT" dirty="0"/>
-              <a:t> </a:t>
-            </a:r>
-            <a:r>
-              <a:rPr lang="pt-PT" dirty="0" err="1"/>
-              <a:t>operation</a:t>
-            </a:r>
-            <a:r>
-              <a:rPr lang="pt-PT" dirty="0"/>
-              <a:t> </a:t>
-            </a:r>
-            <a:r>
-              <a:rPr lang="pt-PT" dirty="0" err="1"/>
-              <a:t>costs</a:t>
-            </a:r>
-            <a:r>
-              <a:rPr lang="pt-PT" dirty="0"/>
-              <a:t> 1 </a:t>
-            </a:r>
-            <a:r>
-              <a:rPr lang="pt-PT" dirty="0" err="1"/>
-              <a:t>piece</a:t>
-            </a:r>
-            <a:r>
-              <a:rPr lang="pt-PT" dirty="0"/>
-              <a:t> </a:t>
-            </a:r>
-            <a:r>
-              <a:rPr lang="pt-PT" dirty="0" err="1"/>
-              <a:t>of</a:t>
-            </a:r>
-            <a:r>
-              <a:rPr lang="pt-PT" dirty="0"/>
-              <a:t> </a:t>
-            </a:r>
-            <a:r>
-              <a:rPr lang="pt-PT" dirty="0" err="1"/>
-              <a:t>snake</a:t>
-            </a:r>
-            <a:r>
-              <a:rPr lang="pt-PT" dirty="0"/>
-              <a:t>;</a:t>
-            </a:r>
-          </a:p>
-          <a:p>
-            <a:pPr lvl="1"/>
-            <a:endParaRPr lang="pt-PT" dirty="0"/>
+              <a:t>Final state: state with a choosen path which may follow the rules defined in the game description. So it will be a matrix similiar with the initial state but, in this case with the tiles representing the solution path marked with a 1.</a:t>
+            </a:r>
           </a:p>
         </p:txBody>
       </p:sp>
@@ -5526,6 +5111,564 @@
       </p:grpSpPr>
       <p:sp>
         <p:nvSpPr>
+          <p:cNvPr id="2" name="Title 1">
+            <a:extLst>
+              <a:ext uri="{FF2B5EF4-FFF2-40B4-BE49-F238E27FC236}">
+                <a16:creationId xmlns:a16="http://schemas.microsoft.com/office/drawing/2014/main" id="{27EA0A15-A027-4F12-A914-BB6A52AC47A1}"/>
+              </a:ext>
+            </a:extLst>
+          </p:cNvPr>
+          <p:cNvSpPr>
+            <a:spLocks noGrp="1"/>
+          </p:cNvSpPr>
+          <p:nvPr>
+            <p:ph type="title"/>
+          </p:nvPr>
+        </p:nvSpPr>
+        <p:spPr>
+          <a:xfrm>
+            <a:off x="820723" y="544418"/>
+            <a:ext cx="10668000" cy="1524000"/>
+          </a:xfrm>
+        </p:spPr>
+        <p:txBody>
+          <a:bodyPr/>
+          <a:lstStyle/>
+          <a:p>
+            <a:r>
+              <a:rPr lang="pt-PT" dirty="0"/>
+              <a:t>Search Problem Formulation</a:t>
+            </a:r>
+          </a:p>
+        </p:txBody>
+      </p:sp>
+      <p:graphicFrame>
+        <p:nvGraphicFramePr>
+          <p:cNvPr id="4" name="Table 5">
+            <a:extLst>
+              <a:ext uri="{FF2B5EF4-FFF2-40B4-BE49-F238E27FC236}">
+                <a16:creationId xmlns:a16="http://schemas.microsoft.com/office/drawing/2014/main" id="{2A3F9839-4261-4ACA-B552-CBD09BE3B284}"/>
+              </a:ext>
+            </a:extLst>
+          </p:cNvPr>
+          <p:cNvGraphicFramePr>
+            <a:graphicFrameLocks noGrp="1"/>
+          </p:cNvGraphicFramePr>
+          <p:nvPr>
+            <p:extLst>
+              <p:ext uri="{D42A27DB-BD31-4B8C-83A1-F6EECF244321}">
+                <p14:modId xmlns:p14="http://schemas.microsoft.com/office/powerpoint/2010/main" val="3057027204"/>
+              </p:ext>
+            </p:extLst>
+          </p:nvPr>
+        </p:nvGraphicFramePr>
+        <p:xfrm>
+          <a:off x="1143633" y="2286000"/>
+          <a:ext cx="9720000" cy="4084320"/>
+        </p:xfrm>
+        <a:graphic>
+          <a:graphicData uri="http://schemas.openxmlformats.org/drawingml/2006/table">
+            <a:tbl>
+              <a:tblPr firstRow="1" bandRow="1">
+                <a:tableStyleId>{5C22544A-7EE6-4342-B048-85BDC9FD1C3A}</a:tableStyleId>
+              </a:tblPr>
+              <a:tblGrid>
+                <a:gridCol w="1224000">
+                  <a:extLst>
+                    <a:ext uri="{9D8B030D-6E8A-4147-A177-3AD203B41FA5}">
+                      <a16:colId xmlns:a16="http://schemas.microsoft.com/office/drawing/2014/main" val="1900299851"/>
+                    </a:ext>
+                  </a:extLst>
+                </a:gridCol>
+                <a:gridCol w="4284000">
+                  <a:extLst>
+                    <a:ext uri="{9D8B030D-6E8A-4147-A177-3AD203B41FA5}">
+                      <a16:colId xmlns:a16="http://schemas.microsoft.com/office/drawing/2014/main" val="2670342692"/>
+                    </a:ext>
+                  </a:extLst>
+                </a:gridCol>
+                <a:gridCol w="4212000">
+                  <a:extLst>
+                    <a:ext uri="{9D8B030D-6E8A-4147-A177-3AD203B41FA5}">
+                      <a16:colId xmlns:a16="http://schemas.microsoft.com/office/drawing/2014/main" val="3521495539"/>
+                    </a:ext>
+                  </a:extLst>
+                </a:gridCol>
+              </a:tblGrid>
+              <a:tr h="288000">
+                <a:tc>
+                  <a:txBody>
+                    <a:bodyPr/>
+                    <a:lstStyle/>
+                    <a:p>
+                      <a:r>
+                        <a:rPr lang="en-GB" sz="1400" dirty="0"/>
+                        <a:t>Operators</a:t>
+                      </a:r>
+                      <a:endParaRPr lang="pt-PT" sz="1400" dirty="0"/>
+                    </a:p>
+                  </a:txBody>
+                  <a:tcPr/>
+                </a:tc>
+                <a:tc>
+                  <a:txBody>
+                    <a:bodyPr/>
+                    <a:lstStyle/>
+                    <a:p>
+                      <a:r>
+                        <a:rPr lang="en-GB" sz="1400" dirty="0"/>
+                        <a:t>Pre-condition</a:t>
+                      </a:r>
+                      <a:endParaRPr lang="pt-PT" sz="1400" dirty="0"/>
+                    </a:p>
+                  </a:txBody>
+                  <a:tcPr/>
+                </a:tc>
+                <a:tc>
+                  <a:txBody>
+                    <a:bodyPr/>
+                    <a:lstStyle/>
+                    <a:p>
+                      <a:r>
+                        <a:rPr lang="en-GB" sz="1400" dirty="0"/>
+                        <a:t>Effects</a:t>
+                      </a:r>
+                      <a:endParaRPr lang="pt-PT" sz="1400" dirty="0"/>
+                    </a:p>
+                  </a:txBody>
+                  <a:tcPr/>
+                </a:tc>
+                <a:extLst>
+                  <a:ext uri="{0D108BD9-81ED-4DB2-BD59-A6C34878D82A}">
+                    <a16:rowId xmlns:a16="http://schemas.microsoft.com/office/drawing/2014/main" val="3458546414"/>
+                  </a:ext>
+                </a:extLst>
+              </a:tr>
+              <a:tr h="728597">
+                <a:tc>
+                  <a:txBody>
+                    <a:bodyPr/>
+                    <a:lstStyle/>
+                    <a:p>
+                      <a:r>
+                        <a:rPr lang="en-GB" sz="1400" dirty="0"/>
+                        <a:t>Move up</a:t>
+                      </a:r>
+                      <a:endParaRPr lang="pt-PT" sz="1400" dirty="0"/>
+                    </a:p>
+                  </a:txBody>
+                  <a:tcPr/>
+                </a:tc>
+                <a:tc>
+                  <a:txBody>
+                    <a:bodyPr/>
+                    <a:lstStyle/>
+                    <a:p>
+                      <a:r>
+                        <a:rPr lang="en-GB" sz="1400" dirty="0"/>
+                        <a:t>- The above tile of the last piece of the snake is empty ( no chess piece nor snake piece);</a:t>
+                      </a:r>
+                    </a:p>
+                    <a:p>
+                      <a:r>
+                        <a:rPr lang="en-GB" sz="1400" dirty="0"/>
+                        <a:t>- The last tile of the snake is not on the top row.</a:t>
+                      </a:r>
+                      <a:endParaRPr lang="pt-PT" sz="1400" dirty="0"/>
+                    </a:p>
+                  </a:txBody>
+                  <a:tcPr/>
+                </a:tc>
+                <a:tc>
+                  <a:txBody>
+                    <a:bodyPr/>
+                    <a:lstStyle/>
+                    <a:p>
+                      <a:r>
+                        <a:rPr lang="en-GB" sz="1400" dirty="0"/>
+                        <a:t>- The above tile of the last piece of the snake is now part of the path too.</a:t>
+                      </a:r>
+                      <a:endParaRPr lang="pt-PT" sz="1400" dirty="0"/>
+                    </a:p>
+                  </a:txBody>
+                  <a:tcPr/>
+                </a:tc>
+                <a:extLst>
+                  <a:ext uri="{0D108BD9-81ED-4DB2-BD59-A6C34878D82A}">
+                    <a16:rowId xmlns:a16="http://schemas.microsoft.com/office/drawing/2014/main" val="1414879794"/>
+                  </a:ext>
+                </a:extLst>
+              </a:tr>
+              <a:tr h="941104">
+                <a:tc>
+                  <a:txBody>
+                    <a:bodyPr/>
+                    <a:lstStyle/>
+                    <a:p>
+                      <a:pPr marL="0" marR="0" lvl="0" indent="0" algn="l" defTabSz="914400" rtl="0" eaLnBrk="1" fontAlgn="auto" latinLnBrk="0" hangingPunct="1">
+                        <a:lnSpc>
+                          <a:spcPct val="100000"/>
+                        </a:lnSpc>
+                        <a:spcBef>
+                          <a:spcPts val="0"/>
+                        </a:spcBef>
+                        <a:spcAft>
+                          <a:spcPts val="0"/>
+                        </a:spcAft>
+                        <a:buClrTx/>
+                        <a:buSzTx/>
+                        <a:buFontTx/>
+                        <a:buNone/>
+                        <a:tabLst/>
+                        <a:defRPr/>
+                      </a:pPr>
+                      <a:r>
+                        <a:rPr lang="en-GB" sz="1400" dirty="0"/>
+                        <a:t>Move Down</a:t>
+                      </a:r>
+                      <a:endParaRPr lang="pt-PT" sz="1400" dirty="0"/>
+                    </a:p>
+                    <a:p>
+                      <a:endParaRPr lang="pt-PT" sz="1400" dirty="0"/>
+                    </a:p>
+                  </a:txBody>
+                  <a:tcPr/>
+                </a:tc>
+                <a:tc>
+                  <a:txBody>
+                    <a:bodyPr/>
+                    <a:lstStyle/>
+                    <a:p>
+                      <a:r>
+                        <a:rPr lang="en-GB" sz="1400" dirty="0"/>
+                        <a:t>- The tile on the bottom of the last piece of the snake is empty (no chess piece nor snake piece);</a:t>
+                      </a:r>
+                    </a:p>
+                    <a:p>
+                      <a:r>
+                        <a:rPr lang="en-GB" sz="1400" dirty="0"/>
+                        <a:t>- The last tile of the snake is not on the last row.</a:t>
+                      </a:r>
+                      <a:endParaRPr lang="pt-PT" sz="1400" dirty="0"/>
+                    </a:p>
+                    <a:p>
+                      <a:endParaRPr lang="pt-PT" sz="1400" dirty="0"/>
+                    </a:p>
+                  </a:txBody>
+                  <a:tcPr/>
+                </a:tc>
+                <a:tc>
+                  <a:txBody>
+                    <a:bodyPr/>
+                    <a:lstStyle/>
+                    <a:p>
+                      <a:pPr marL="0" marR="0" lvl="0" indent="0" algn="l" defTabSz="914400" rtl="0" eaLnBrk="1" fontAlgn="auto" latinLnBrk="0" hangingPunct="1">
+                        <a:lnSpc>
+                          <a:spcPct val="100000"/>
+                        </a:lnSpc>
+                        <a:spcBef>
+                          <a:spcPts val="0"/>
+                        </a:spcBef>
+                        <a:spcAft>
+                          <a:spcPts val="0"/>
+                        </a:spcAft>
+                        <a:buClrTx/>
+                        <a:buSzTx/>
+                        <a:buFontTx/>
+                        <a:buNone/>
+                        <a:tabLst/>
+                        <a:defRPr/>
+                      </a:pPr>
+                      <a:r>
+                        <a:rPr lang="en-GB" sz="1400" dirty="0"/>
+                        <a:t>- The tile on the bottom of the last piece of the snake is now part of the path too.</a:t>
+                      </a:r>
+                      <a:endParaRPr lang="pt-PT" sz="1400" dirty="0"/>
+                    </a:p>
+                    <a:p>
+                      <a:endParaRPr lang="pt-PT" sz="1400" dirty="0"/>
+                    </a:p>
+                  </a:txBody>
+                  <a:tcPr/>
+                </a:tc>
+                <a:extLst>
+                  <a:ext uri="{0D108BD9-81ED-4DB2-BD59-A6C34878D82A}">
+                    <a16:rowId xmlns:a16="http://schemas.microsoft.com/office/drawing/2014/main" val="3434043383"/>
+                  </a:ext>
+                </a:extLst>
+              </a:tr>
+              <a:tr h="1153612">
+                <a:tc>
+                  <a:txBody>
+                    <a:bodyPr/>
+                    <a:lstStyle/>
+                    <a:p>
+                      <a:pPr marL="0" marR="0" lvl="0" indent="0" algn="l" defTabSz="914400" rtl="0" eaLnBrk="1" fontAlgn="auto" latinLnBrk="0" hangingPunct="1">
+                        <a:lnSpc>
+                          <a:spcPct val="100000"/>
+                        </a:lnSpc>
+                        <a:spcBef>
+                          <a:spcPts val="0"/>
+                        </a:spcBef>
+                        <a:spcAft>
+                          <a:spcPts val="0"/>
+                        </a:spcAft>
+                        <a:buClrTx/>
+                        <a:buSzTx/>
+                        <a:buFontTx/>
+                        <a:buNone/>
+                        <a:tabLst/>
+                        <a:defRPr/>
+                      </a:pPr>
+                      <a:r>
+                        <a:rPr lang="en-GB" sz="1400" dirty="0"/>
+                        <a:t>Move Left</a:t>
+                      </a:r>
+                      <a:endParaRPr lang="pt-PT" sz="1400" dirty="0"/>
+                    </a:p>
+                    <a:p>
+                      <a:endParaRPr lang="pt-PT" sz="1400" dirty="0"/>
+                    </a:p>
+                  </a:txBody>
+                  <a:tcPr/>
+                </a:tc>
+                <a:tc>
+                  <a:txBody>
+                    <a:bodyPr/>
+                    <a:lstStyle/>
+                    <a:p>
+                      <a:r>
+                        <a:rPr lang="en-GB" sz="1400" dirty="0"/>
+                        <a:t>- The tile on the left of the last piece of the snake is empty ( no chess piece nor snake piece);</a:t>
+                      </a:r>
+                    </a:p>
+                    <a:p>
+                      <a:r>
+                        <a:rPr lang="en-GB" sz="1400" dirty="0"/>
+                        <a:t>- The last tile of the snake is not on the first column.</a:t>
+                      </a:r>
+                      <a:endParaRPr lang="pt-PT" sz="1400" dirty="0"/>
+                    </a:p>
+                    <a:p>
+                      <a:endParaRPr lang="pt-PT" sz="1400" dirty="0"/>
+                    </a:p>
+                  </a:txBody>
+                  <a:tcPr/>
+                </a:tc>
+                <a:tc>
+                  <a:txBody>
+                    <a:bodyPr/>
+                    <a:lstStyle/>
+                    <a:p>
+                      <a:pPr marL="0" marR="0" lvl="0" indent="0" algn="l" defTabSz="914400" rtl="0" eaLnBrk="1" fontAlgn="auto" latinLnBrk="0" hangingPunct="1">
+                        <a:lnSpc>
+                          <a:spcPct val="100000"/>
+                        </a:lnSpc>
+                        <a:spcBef>
+                          <a:spcPts val="0"/>
+                        </a:spcBef>
+                        <a:spcAft>
+                          <a:spcPts val="0"/>
+                        </a:spcAft>
+                        <a:buClrTx/>
+                        <a:buSzTx/>
+                        <a:buFontTx/>
+                        <a:buNone/>
+                        <a:tabLst/>
+                        <a:defRPr/>
+                      </a:pPr>
+                      <a:r>
+                        <a:rPr lang="en-GB" sz="1400" dirty="0"/>
+                        <a:t>- The tile on the left of the snake is now part of the path too.</a:t>
+                      </a:r>
+                      <a:endParaRPr lang="pt-PT" sz="1400" dirty="0"/>
+                    </a:p>
+                  </a:txBody>
+                  <a:tcPr/>
+                </a:tc>
+                <a:extLst>
+                  <a:ext uri="{0D108BD9-81ED-4DB2-BD59-A6C34878D82A}">
+                    <a16:rowId xmlns:a16="http://schemas.microsoft.com/office/drawing/2014/main" val="4161733167"/>
+                  </a:ext>
+                </a:extLst>
+              </a:tr>
+              <a:tr h="941104">
+                <a:tc>
+                  <a:txBody>
+                    <a:bodyPr/>
+                    <a:lstStyle/>
+                    <a:p>
+                      <a:pPr marL="0" marR="0" lvl="0" indent="0" algn="l" defTabSz="914400" rtl="0" eaLnBrk="1" fontAlgn="auto" latinLnBrk="0" hangingPunct="1">
+                        <a:lnSpc>
+                          <a:spcPct val="100000"/>
+                        </a:lnSpc>
+                        <a:spcBef>
+                          <a:spcPts val="0"/>
+                        </a:spcBef>
+                        <a:spcAft>
+                          <a:spcPts val="0"/>
+                        </a:spcAft>
+                        <a:buClrTx/>
+                        <a:buSzTx/>
+                        <a:buFontTx/>
+                        <a:buNone/>
+                        <a:tabLst/>
+                        <a:defRPr/>
+                      </a:pPr>
+                      <a:r>
+                        <a:rPr lang="en-GB" sz="1400" dirty="0"/>
+                        <a:t>Move Right</a:t>
+                      </a:r>
+                      <a:endParaRPr lang="pt-PT" sz="1400" dirty="0"/>
+                    </a:p>
+                    <a:p>
+                      <a:endParaRPr lang="pt-PT" sz="1400" dirty="0"/>
+                    </a:p>
+                  </a:txBody>
+                  <a:tcPr/>
+                </a:tc>
+                <a:tc>
+                  <a:txBody>
+                    <a:bodyPr/>
+                    <a:lstStyle/>
+                    <a:p>
+                      <a:r>
+                        <a:rPr lang="en-GB" sz="1400" dirty="0"/>
+                        <a:t>- The tile on the </a:t>
+                      </a:r>
+                      <a:r>
+                        <a:rPr lang="en-GB" sz="1400" dirty="0" err="1"/>
+                        <a:t>rigth</a:t>
+                      </a:r>
+                      <a:r>
+                        <a:rPr lang="en-GB" sz="1400" dirty="0"/>
+                        <a:t> of the last piece of the snake is empty ( no chess piece nor snake piece);</a:t>
+                      </a:r>
+                    </a:p>
+                    <a:p>
+                      <a:r>
+                        <a:rPr lang="en-GB" sz="1400" dirty="0"/>
+                        <a:t>- The last tile of the snake is not on the last column.</a:t>
+                      </a:r>
+                      <a:endParaRPr lang="pt-PT" sz="1400" dirty="0"/>
+                    </a:p>
+                    <a:p>
+                      <a:endParaRPr lang="pt-PT" sz="1400" dirty="0"/>
+                    </a:p>
+                  </a:txBody>
+                  <a:tcPr/>
+                </a:tc>
+                <a:tc>
+                  <a:txBody>
+                    <a:bodyPr/>
+                    <a:lstStyle/>
+                    <a:p>
+                      <a:pPr marL="0" marR="0" lvl="0" indent="0" algn="l" defTabSz="914400" rtl="0" eaLnBrk="1" fontAlgn="auto" latinLnBrk="0" hangingPunct="1">
+                        <a:lnSpc>
+                          <a:spcPct val="100000"/>
+                        </a:lnSpc>
+                        <a:spcBef>
+                          <a:spcPts val="0"/>
+                        </a:spcBef>
+                        <a:spcAft>
+                          <a:spcPts val="0"/>
+                        </a:spcAft>
+                        <a:buClrTx/>
+                        <a:buSzTx/>
+                        <a:buFontTx/>
+                        <a:buNone/>
+                        <a:tabLst/>
+                        <a:defRPr/>
+                      </a:pPr>
+                      <a:r>
+                        <a:rPr lang="en-GB" sz="1400" dirty="0"/>
+                        <a:t>The tile on the right of the snake is now part of the path too.</a:t>
+                      </a:r>
+                      <a:endParaRPr lang="pt-PT" sz="1400" dirty="0"/>
+                    </a:p>
+                    <a:p>
+                      <a:endParaRPr lang="pt-PT" sz="1400" dirty="0"/>
+                    </a:p>
+                  </a:txBody>
+                  <a:tcPr/>
+                </a:tc>
+                <a:extLst>
+                  <a:ext uri="{0D108BD9-81ED-4DB2-BD59-A6C34878D82A}">
+                    <a16:rowId xmlns:a16="http://schemas.microsoft.com/office/drawing/2014/main" val="1000675557"/>
+                  </a:ext>
+                </a:extLst>
+              </a:tr>
+            </a:tbl>
+          </a:graphicData>
+        </a:graphic>
+      </p:graphicFrame>
+      <p:sp>
+        <p:nvSpPr>
+          <p:cNvPr id="8" name="Marcador de Posição de Conteúdo 2">
+            <a:extLst>
+              <a:ext uri="{FF2B5EF4-FFF2-40B4-BE49-F238E27FC236}">
+                <a16:creationId xmlns:a16="http://schemas.microsoft.com/office/drawing/2014/main" id="{96D95CC1-ECCC-45D2-987C-3AFB7CEA23D7}"/>
+              </a:ext>
+            </a:extLst>
+          </p:cNvPr>
+          <p:cNvSpPr>
+            <a:spLocks noGrp="1"/>
+          </p:cNvSpPr>
+          <p:nvPr>
+            <p:ph idx="1"/>
+          </p:nvPr>
+        </p:nvSpPr>
+        <p:spPr>
+          <a:xfrm>
+            <a:off x="762000" y="1656825"/>
+            <a:ext cx="10668000" cy="3818083"/>
+          </a:xfrm>
+        </p:spPr>
+        <p:txBody>
+          <a:bodyPr>
+            <a:normAutofit/>
+          </a:bodyPr>
+          <a:lstStyle/>
+          <a:p>
+            <a:r>
+              <a:rPr lang="pt-PT" dirty="0"/>
+              <a:t>Operators</a:t>
+            </a:r>
+          </a:p>
+        </p:txBody>
+      </p:sp>
+    </p:spTree>
+    <p:extLst>
+      <p:ext uri="{BB962C8B-B14F-4D97-AF65-F5344CB8AC3E}">
+        <p14:creationId xmlns:p14="http://schemas.microsoft.com/office/powerpoint/2010/main" val="710399668"/>
+      </p:ext>
+    </p:extLst>
+  </p:cSld>
+  <p:clrMapOvr>
+    <a:masterClrMapping/>
+  </p:clrMapOvr>
+</p:sld>
+</file>
+
+<file path=ppt/slides/slide6.xml><?xml version="1.0" encoding="utf-8"?>
+<p:sld xmlns:a="http://schemas.openxmlformats.org/drawingml/2006/main" xmlns:r="http://schemas.openxmlformats.org/officeDocument/2006/relationships" xmlns:p="http://schemas.openxmlformats.org/presentationml/2006/main">
+  <p:cSld>
+    <p:spTree>
+      <p:nvGrpSpPr>
+        <p:cNvPr id="1" name=""/>
+        <p:cNvGrpSpPr/>
+        <p:nvPr/>
+      </p:nvGrpSpPr>
+      <p:grpSpPr>
+        <a:xfrm>
+          <a:off x="0" y="0"/>
+          <a:ext cx="0" cy="0"/>
+          <a:chOff x="0" y="0"/>
+          <a:chExt cx="0" cy="0"/>
+        </a:xfrm>
+      </p:grpSpPr>
+      <p:sp>
+        <p:nvSpPr>
           <p:cNvPr id="2" name="Título 1">
             <a:extLst>
               <a:ext uri="{FF2B5EF4-FFF2-40B4-BE49-F238E27FC236}">
@@ -5575,108 +5718,20 @@
           <a:lstStyle/>
           <a:p>
             <a:r>
-              <a:rPr lang="pt-PT" dirty="0" err="1"/>
-              <a:t>Prefered</a:t>
-            </a:r>
-            <a:r>
               <a:rPr lang="pt-PT" dirty="0"/>
-              <a:t> </a:t>
-            </a:r>
-            <a:r>
-              <a:rPr lang="pt-PT" dirty="0" err="1"/>
-              <a:t>IDE’s</a:t>
-            </a:r>
+              <a:t>Prefered Languages: Python.</a:t>
+            </a:r>
+          </a:p>
+          <a:p>
             <a:r>
               <a:rPr lang="pt-PT" dirty="0"/>
-              <a:t>: Visual </a:t>
-            </a:r>
-            <a:r>
-              <a:rPr lang="pt-PT" dirty="0" err="1"/>
-              <a:t>Studio</a:t>
-            </a:r>
+              <a:t>Data structures: board ( class the will represented the game state) and piece (aclass which defines the possible attacks of the chess piece and stores its position).</a:t>
+            </a:r>
+          </a:p>
+          <a:p>
             <a:r>
               <a:rPr lang="pt-PT" dirty="0"/>
-              <a:t>, </a:t>
-            </a:r>
-            <a:r>
-              <a:rPr lang="pt-PT" dirty="0" err="1"/>
-              <a:t>CLion</a:t>
-            </a:r>
-            <a:r>
-              <a:rPr lang="pt-PT" dirty="0"/>
-              <a:t>;</a:t>
-            </a:r>
-          </a:p>
-          <a:p>
-            <a:r>
-              <a:rPr lang="pt-PT" dirty="0" err="1"/>
-              <a:t>Prefered</a:t>
-            </a:r>
-            <a:r>
-              <a:rPr lang="pt-PT" dirty="0"/>
-              <a:t> </a:t>
-            </a:r>
-            <a:r>
-              <a:rPr lang="pt-PT" dirty="0" err="1"/>
-              <a:t>Languages</a:t>
-            </a:r>
-            <a:r>
-              <a:rPr lang="pt-PT" dirty="0"/>
-              <a:t>: C++, C, </a:t>
-            </a:r>
-            <a:r>
-              <a:rPr lang="pt-PT" dirty="0" err="1"/>
-              <a:t>Python</a:t>
-            </a:r>
-            <a:r>
-              <a:rPr lang="pt-PT" dirty="0"/>
-              <a:t>;</a:t>
-            </a:r>
-          </a:p>
-          <a:p>
-            <a:r>
-              <a:rPr lang="pt-PT" dirty="0"/>
-              <a:t>Data </a:t>
-            </a:r>
-            <a:r>
-              <a:rPr lang="pt-PT" dirty="0" err="1"/>
-              <a:t>structures</a:t>
-            </a:r>
-            <a:r>
-              <a:rPr lang="pt-PT" dirty="0"/>
-              <a:t>: </a:t>
-            </a:r>
-            <a:r>
-              <a:rPr lang="pt-PT" dirty="0" err="1"/>
-              <a:t>arrays</a:t>
-            </a:r>
-            <a:r>
-              <a:rPr lang="pt-PT" dirty="0"/>
-              <a:t>, </a:t>
-            </a:r>
-            <a:r>
-              <a:rPr lang="pt-PT" dirty="0" err="1"/>
-              <a:t>vectors</a:t>
-            </a:r>
-            <a:r>
-              <a:rPr lang="pt-PT" dirty="0"/>
-              <a:t>, </a:t>
-            </a:r>
-            <a:r>
-              <a:rPr lang="pt-PT" dirty="0" err="1"/>
-              <a:t>strings</a:t>
-            </a:r>
-            <a:r>
-              <a:rPr lang="pt-PT" dirty="0"/>
-              <a:t>, </a:t>
-            </a:r>
-            <a:r>
-              <a:rPr lang="pt-PT" dirty="0" err="1"/>
-              <a:t>booleans</a:t>
-            </a:r>
-            <a:r>
-              <a:rPr lang="pt-PT" dirty="0"/>
-              <a:t>;</a:t>
+              <a:t>The initial state is defined by reading the saved text files with board information.</a:t>
             </a:r>
           </a:p>
           <a:p>

</xml_diff>